<commit_message>
Updated wording on images in resource folder.
</commit_message>
<xml_diff>
--- a/Processing/Safety_Runner_previous_version/Safety Signs October -6-2020.pptx
+++ b/Processing/Safety_Runner_previous_version/Safety Signs October -6-2020.pptx
@@ -5,10 +5,10 @@
     <p:sldMasterId id="2147483672" r:id="rId1"/>
   </p:sldMasterIdLst>
   <p:sldIdLst>
-    <p:sldId id="256" r:id="rId2"/>
-    <p:sldId id="261" r:id="rId3"/>
-    <p:sldId id="268" r:id="rId4"/>
-    <p:sldId id="259" r:id="rId5"/>
+    <p:sldId id="261" r:id="rId2"/>
+    <p:sldId id="268" r:id="rId3"/>
+    <p:sldId id="259" r:id="rId4"/>
+    <p:sldId id="270" r:id="rId5"/>
     <p:sldId id="266" r:id="rId6"/>
     <p:sldId id="263" r:id="rId7"/>
     <p:sldId id="267" r:id="rId8"/>
@@ -252,7 +252,7 @@
           <a:p>
             <a:fld id="{B131D51D-C616-464B-9024-A459CBB37EE5}" type="datetimeFigureOut">
               <a:rPr lang="en-US" smtClean="0"/>
-              <a:t>10/14/2020</a:t>
+              <a:t>10/15/2020</a:t>
             </a:fld>
             <a:endParaRPr lang="en-US"/>
           </a:p>
@@ -422,7 +422,7 @@
           <a:p>
             <a:fld id="{B131D51D-C616-464B-9024-A459CBB37EE5}" type="datetimeFigureOut">
               <a:rPr lang="en-US" smtClean="0"/>
-              <a:t>10/14/2020</a:t>
+              <a:t>10/15/2020</a:t>
             </a:fld>
             <a:endParaRPr lang="en-US"/>
           </a:p>
@@ -602,7 +602,7 @@
           <a:p>
             <a:fld id="{B131D51D-C616-464B-9024-A459CBB37EE5}" type="datetimeFigureOut">
               <a:rPr lang="en-US" smtClean="0"/>
-              <a:t>10/14/2020</a:t>
+              <a:t>10/15/2020</a:t>
             </a:fld>
             <a:endParaRPr lang="en-US"/>
           </a:p>
@@ -772,7 +772,7 @@
           <a:p>
             <a:fld id="{B131D51D-C616-464B-9024-A459CBB37EE5}" type="datetimeFigureOut">
               <a:rPr lang="en-US" smtClean="0"/>
-              <a:t>10/14/2020</a:t>
+              <a:t>10/15/2020</a:t>
             </a:fld>
             <a:endParaRPr lang="en-US"/>
           </a:p>
@@ -1018,7 +1018,7 @@
           <a:p>
             <a:fld id="{B131D51D-C616-464B-9024-A459CBB37EE5}" type="datetimeFigureOut">
               <a:rPr lang="en-US" smtClean="0"/>
-              <a:t>10/14/2020</a:t>
+              <a:t>10/15/2020</a:t>
             </a:fld>
             <a:endParaRPr lang="en-US"/>
           </a:p>
@@ -1250,7 +1250,7 @@
           <a:p>
             <a:fld id="{B131D51D-C616-464B-9024-A459CBB37EE5}" type="datetimeFigureOut">
               <a:rPr lang="en-US" smtClean="0"/>
-              <a:t>10/14/2020</a:t>
+              <a:t>10/15/2020</a:t>
             </a:fld>
             <a:endParaRPr lang="en-US"/>
           </a:p>
@@ -1617,7 +1617,7 @@
           <a:p>
             <a:fld id="{B131D51D-C616-464B-9024-A459CBB37EE5}" type="datetimeFigureOut">
               <a:rPr lang="en-US" smtClean="0"/>
-              <a:t>10/14/2020</a:t>
+              <a:t>10/15/2020</a:t>
             </a:fld>
             <a:endParaRPr lang="en-US"/>
           </a:p>
@@ -1735,7 +1735,7 @@
           <a:p>
             <a:fld id="{B131D51D-C616-464B-9024-A459CBB37EE5}" type="datetimeFigureOut">
               <a:rPr lang="en-US" smtClean="0"/>
-              <a:t>10/14/2020</a:t>
+              <a:t>10/15/2020</a:t>
             </a:fld>
             <a:endParaRPr lang="en-US"/>
           </a:p>
@@ -1830,7 +1830,7 @@
           <a:p>
             <a:fld id="{B131D51D-C616-464B-9024-A459CBB37EE5}" type="datetimeFigureOut">
               <a:rPr lang="en-US" smtClean="0"/>
-              <a:t>10/14/2020</a:t>
+              <a:t>10/15/2020</a:t>
             </a:fld>
             <a:endParaRPr lang="en-US"/>
           </a:p>
@@ -2107,7 +2107,7 @@
           <a:p>
             <a:fld id="{B131D51D-C616-464B-9024-A459CBB37EE5}" type="datetimeFigureOut">
               <a:rPr lang="en-US" smtClean="0"/>
-              <a:t>10/14/2020</a:t>
+              <a:t>10/15/2020</a:t>
             </a:fld>
             <a:endParaRPr lang="en-US"/>
           </a:p>
@@ -2364,7 +2364,7 @@
           <a:p>
             <a:fld id="{B131D51D-C616-464B-9024-A459CBB37EE5}" type="datetimeFigureOut">
               <a:rPr lang="en-US" smtClean="0"/>
-              <a:t>10/14/2020</a:t>
+              <a:t>10/15/2020</a:t>
             </a:fld>
             <a:endParaRPr lang="en-US"/>
           </a:p>
@@ -2577,7 +2577,7 @@
           <a:p>
             <a:fld id="{B131D51D-C616-464B-9024-A459CBB37EE5}" type="datetimeFigureOut">
               <a:rPr lang="en-US" smtClean="0"/>
-              <a:t>10/14/2020</a:t>
+              <a:t>10/15/2020</a:t>
             </a:fld>
             <a:endParaRPr lang="en-US"/>
           </a:p>
@@ -3036,81 +3036,41 @@
           </a:p>
         </p:txBody>
       </p:sp>
-      <p:grpSp>
-        <p:nvGrpSpPr>
-          <p:cNvPr id="3" name="Group 2">
+      <p:sp>
+        <p:nvSpPr>
+          <p:cNvPr id="11" name="Rectangle 10">
             <a:extLst>
               <a:ext uri="{FF2B5EF4-FFF2-40B4-BE49-F238E27FC236}">
-                <a16:creationId xmlns:a16="http://schemas.microsoft.com/office/drawing/2014/main" id="{6AB65601-AE1B-48A9-BA89-80324E082538}"/>
+                <a16:creationId xmlns:a16="http://schemas.microsoft.com/office/drawing/2014/main" id="{406725B8-744B-484A-BCF6-CC97C3BA171C}"/>
               </a:ext>
             </a:extLst>
           </p:cNvPr>
-          <p:cNvGrpSpPr/>
+          <p:cNvSpPr/>
           <p:nvPr/>
-        </p:nvGrpSpPr>
-        <p:grpSpPr>
-          <a:xfrm>
-            <a:off x="722975" y="156915"/>
-            <a:ext cx="8293211" cy="953374"/>
-            <a:chOff x="956581" y="1806915"/>
-            <a:chExt cx="11063101" cy="1801810"/>
-          </a:xfrm>
-        </p:grpSpPr>
-        <p:sp>
-          <p:nvSpPr>
-            <p:cNvPr id="11" name="Rectangle 10">
-              <a:extLst>
-                <a:ext uri="{FF2B5EF4-FFF2-40B4-BE49-F238E27FC236}">
-                  <a16:creationId xmlns:a16="http://schemas.microsoft.com/office/drawing/2014/main" id="{406725B8-744B-484A-BCF6-CC97C3BA171C}"/>
-                </a:ext>
-              </a:extLst>
-            </p:cNvPr>
-            <p:cNvSpPr/>
-            <p:nvPr/>
-          </p:nvSpPr>
-          <p:spPr>
-            <a:xfrm>
-              <a:off x="2828298" y="1894235"/>
-              <a:ext cx="9191384" cy="1714490"/>
-            </a:xfrm>
-            <a:prstGeom prst="rect">
-              <a:avLst/>
-            </a:prstGeom>
-            <a:noFill/>
-          </p:spPr>
-          <p:txBody>
-            <a:bodyPr wrap="square" lIns="75438" tIns="37719" rIns="75438" bIns="37719">
-              <a:spAutoFit/>
-            </a:bodyPr>
-            <a:lstStyle/>
-            <a:p>
-              <a:pPr algn="ctr">
-                <a:tabLst>
-                  <a:tab pos="5830888" algn="l"/>
-                </a:tabLst>
-              </a:pPr>
-              <a:r>
-                <a:rPr lang="en-US" sz="5400" b="1" dirty="0">
-                  <a:ln w="10160">
-                    <a:noFill/>
-                    <a:prstDash val="solid"/>
-                  </a:ln>
-                  <a:solidFill>
-                    <a:srgbClr val="FFFFFF"/>
-                  </a:solidFill>
-                  <a:effectLst>
-                    <a:outerShdw blurRad="38100" dist="22860" dir="5400000" algn="tl" rotWithShape="0">
-                      <a:srgbClr val="000000">
-                        <a:alpha val="30000"/>
-                      </a:srgbClr>
-                    </a:outerShdw>
-                  </a:effectLst>
-                  <a:latin typeface="Times New Roman" panose="02020603050405020304" pitchFamily="18" charset="0"/>
-                  <a:cs typeface="Times New Roman" panose="02020603050405020304" pitchFamily="18" charset="0"/>
-                </a:rPr>
-                <a:t>DANGER</a:t>
-              </a:r>
-              <a:endParaRPr lang="en-US" sz="8800" b="1" dirty="0">
+        </p:nvSpPr>
+        <p:spPr>
+          <a:xfrm>
+            <a:off x="2126067" y="203118"/>
+            <a:ext cx="6890119" cy="907171"/>
+          </a:xfrm>
+          <a:prstGeom prst="rect">
+            <a:avLst/>
+          </a:prstGeom>
+          <a:noFill/>
+        </p:spPr>
+        <p:txBody>
+          <a:bodyPr wrap="square" lIns="75438" tIns="37719" rIns="75438" bIns="37719">
+            <a:spAutoFit/>
+          </a:bodyPr>
+          <a:lstStyle/>
+          <a:p>
+            <a:pPr algn="ctr">
+              <a:tabLst>
+                <a:tab pos="5830888" algn="l"/>
+              </a:tabLst>
+            </a:pPr>
+            <a:r>
+              <a:rPr lang="en-US" sz="5400" b="1" dirty="0">
                 <a:ln w="10160">
                   <a:noFill/>
                   <a:prstDash val="solid"/>
@@ -3127,47 +3087,30 @@
                 </a:effectLst>
                 <a:latin typeface="Times New Roman" panose="02020603050405020304" pitchFamily="18" charset="0"/>
                 <a:cs typeface="Times New Roman" panose="02020603050405020304" pitchFamily="18" charset="0"/>
-              </a:endParaRPr>
-            </a:p>
-          </p:txBody>
-        </p:sp>
-        <p:pic>
-          <p:nvPicPr>
-            <p:cNvPr id="22" name="Picture 21" descr="A close up of a sign&#10;&#10;Description automatically generated">
-              <a:extLst>
-                <a:ext uri="{FF2B5EF4-FFF2-40B4-BE49-F238E27FC236}">
-                  <a16:creationId xmlns:a16="http://schemas.microsoft.com/office/drawing/2014/main" id="{01BB75ED-952E-42D6-A38D-87B08CA4B753}"/>
-                </a:ext>
-              </a:extLst>
-            </p:cNvPr>
-            <p:cNvPicPr>
-              <a:picLocks noChangeAspect="1"/>
-            </p:cNvPicPr>
-            <p:nvPr/>
-          </p:nvPicPr>
-          <p:blipFill>
-            <a:blip r:embed="rId2">
-              <a:extLst>
-                <a:ext uri="{28A0092B-C50C-407E-A947-70E740481C1C}">
-                  <a14:useLocalDpi xmlns:a14="http://schemas.microsoft.com/office/drawing/2010/main" val="0"/>
-                </a:ext>
-              </a:extLst>
-            </a:blip>
-            <a:stretch>
-              <a:fillRect/>
-            </a:stretch>
-          </p:blipFill>
-          <p:spPr>
-            <a:xfrm>
-              <a:off x="956581" y="1806915"/>
-              <a:ext cx="1505979" cy="1714490"/>
-            </a:xfrm>
-            <a:prstGeom prst="rect">
-              <a:avLst/>
-            </a:prstGeom>
-          </p:spPr>
-        </p:pic>
-      </p:grpSp>
+              </a:rPr>
+              <a:t>DANGER</a:t>
+            </a:r>
+            <a:endParaRPr lang="en-US" sz="8800" b="1" dirty="0">
+              <a:ln w="10160">
+                <a:noFill/>
+                <a:prstDash val="solid"/>
+              </a:ln>
+              <a:solidFill>
+                <a:srgbClr val="FFFFFF"/>
+              </a:solidFill>
+              <a:effectLst>
+                <a:outerShdw blurRad="38100" dist="22860" dir="5400000" algn="tl" rotWithShape="0">
+                  <a:srgbClr val="000000">
+                    <a:alpha val="30000"/>
+                  </a:srgbClr>
+                </a:outerShdw>
+              </a:effectLst>
+              <a:latin typeface="Times New Roman" panose="02020603050405020304" pitchFamily="18" charset="0"/>
+              <a:cs typeface="Times New Roman" panose="02020603050405020304" pitchFamily="18" charset="0"/>
+            </a:endParaRPr>
+          </a:p>
+        </p:txBody>
+      </p:sp>
       <p:pic>
         <p:nvPicPr>
           <p:cNvPr id="24" name="Picture 23">
@@ -3183,13 +3126,13 @@
           <p:nvPr/>
         </p:nvPicPr>
         <p:blipFill>
-          <a:blip r:embed="rId3">
+          <a:blip r:embed="rId2">
             <a:extLst>
               <a:ext uri="{28A0092B-C50C-407E-A947-70E740481C1C}">
                 <a14:useLocalDpi xmlns:a14="http://schemas.microsoft.com/office/drawing/2010/main" val="0"/>
               </a:ext>
               <a:ext uri="{96DAC541-7B7A-43D3-8B79-37D633B846F1}">
-                <asvg:svgBlip xmlns:asvg="http://schemas.microsoft.com/office/drawing/2016/SVG/main" r:embed="rId4"/>
+                <asvg:svgBlip xmlns:asvg="http://schemas.microsoft.com/office/drawing/2016/SVG/main" r:embed="rId3"/>
               </a:ext>
             </a:extLst>
           </a:blip>
@@ -3206,12 +3149,131 @@
           </a:prstGeom>
         </p:spPr>
       </p:pic>
+      <p:sp>
+        <p:nvSpPr>
+          <p:cNvPr id="10" name="TextBox 9">
+            <a:extLst>
+              <a:ext uri="{FF2B5EF4-FFF2-40B4-BE49-F238E27FC236}">
+                <a16:creationId xmlns:a16="http://schemas.microsoft.com/office/drawing/2014/main" id="{B354DA9C-2313-40D7-87D0-268051616CAD}"/>
+              </a:ext>
+            </a:extLst>
+          </p:cNvPr>
+          <p:cNvSpPr txBox="1"/>
+          <p:nvPr/>
+        </p:nvSpPr>
+        <p:spPr>
+          <a:xfrm>
+            <a:off x="2626469" y="1227340"/>
+            <a:ext cx="6517531" cy="2793842"/>
+          </a:xfrm>
+          <a:prstGeom prst="rect">
+            <a:avLst/>
+          </a:prstGeom>
+          <a:noFill/>
+        </p:spPr>
+        <p:txBody>
+          <a:bodyPr wrap="square" rtlCol="0">
+            <a:spAutoFit/>
+          </a:bodyPr>
+          <a:lstStyle/>
+          <a:p>
+            <a:pPr algn="ctr"/>
+            <a:endParaRPr lang="en-US" sz="2000" b="1" dirty="0">
+              <a:latin typeface="Times New Roman" panose="02020603050405020304" pitchFamily="18" charset="0"/>
+              <a:cs typeface="Times New Roman" panose="02020603050405020304" pitchFamily="18" charset="0"/>
+            </a:endParaRPr>
+          </a:p>
+          <a:p>
+            <a:pPr algn="ctr"/>
+            <a:r>
+              <a:rPr lang="en-US" sz="4800" b="1" dirty="0">
+                <a:latin typeface="Times New Roman" panose="02020603050405020304" pitchFamily="18" charset="0"/>
+                <a:cs typeface="Times New Roman" panose="02020603050405020304" pitchFamily="18" charset="0"/>
+              </a:rPr>
+              <a:t>Laser Firing</a:t>
+            </a:r>
+          </a:p>
+          <a:p>
+            <a:pPr algn="ctr"/>
+            <a:endParaRPr lang="en-US" sz="2800" b="1" dirty="0">
+              <a:latin typeface="Times New Roman" panose="02020603050405020304" pitchFamily="18" charset="0"/>
+              <a:cs typeface="Times New Roman" panose="02020603050405020304" pitchFamily="18" charset="0"/>
+            </a:endParaRPr>
+          </a:p>
+          <a:p>
+            <a:pPr algn="ctr"/>
+            <a:r>
+              <a:rPr lang="en-US" sz="2800" b="1" dirty="0">
+                <a:latin typeface="Times New Roman" panose="02020603050405020304" pitchFamily="18" charset="0"/>
+                <a:cs typeface="Times New Roman" panose="02020603050405020304" pitchFamily="18" charset="0"/>
+              </a:rPr>
+              <a:t>Do not enter laser chamber.</a:t>
+            </a:r>
+          </a:p>
+          <a:p>
+            <a:pPr algn="ctr"/>
+            <a:endParaRPr lang="en-US" sz="2000" b="1" dirty="0">
+              <a:latin typeface="Times New Roman" panose="02020603050405020304" pitchFamily="18" charset="0"/>
+              <a:cs typeface="Times New Roman" panose="02020603050405020304" pitchFamily="18" charset="0"/>
+            </a:endParaRPr>
+          </a:p>
+          <a:p>
+            <a:pPr algn="ctr"/>
+            <a:endParaRPr lang="en-US" sz="2000" b="1" dirty="0">
+              <a:latin typeface="Times New Roman" panose="02020603050405020304" pitchFamily="18" charset="0"/>
+              <a:cs typeface="Times New Roman" panose="02020603050405020304" pitchFamily="18" charset="0"/>
+            </a:endParaRPr>
+          </a:p>
+          <a:p>
+            <a:endParaRPr lang="en-US" sz="1155" dirty="0">
+              <a:latin typeface="Arial Black" panose="020B0A04020102020204" pitchFamily="34" charset="0"/>
+              <a:cs typeface="Arial" panose="020B0604020202020204" pitchFamily="34" charset="0"/>
+            </a:endParaRPr>
+          </a:p>
+        </p:txBody>
+      </p:sp>
+      <p:pic>
+        <p:nvPicPr>
+          <p:cNvPr id="13" name="Picture 12" descr="A close up of a sign&#10;&#10;Description automatically generated">
+            <a:extLst>
+              <a:ext uri="{FF2B5EF4-FFF2-40B4-BE49-F238E27FC236}">
+                <a16:creationId xmlns:a16="http://schemas.microsoft.com/office/drawing/2014/main" id="{2E1A5342-253C-43BB-9455-6599A5D03AB6}"/>
+              </a:ext>
+            </a:extLst>
+          </p:cNvPr>
+          <p:cNvPicPr>
+            <a:picLocks noChangeAspect="1"/>
+          </p:cNvPicPr>
+          <p:nvPr/>
+        </p:nvPicPr>
+        <p:blipFill>
+          <a:blip r:embed="rId4">
+            <a:extLst>
+              <a:ext uri="{28A0092B-C50C-407E-A947-70E740481C1C}">
+                <a14:useLocalDpi xmlns:a14="http://schemas.microsoft.com/office/drawing/2010/main" val="0"/>
+              </a:ext>
+            </a:extLst>
+          </a:blip>
+          <a:stretch>
+            <a:fillRect/>
+          </a:stretch>
+        </p:blipFill>
+        <p:spPr>
+          <a:xfrm>
+            <a:off x="54445" y="2073654"/>
+            <a:ext cx="2465985" cy="2178432"/>
+          </a:xfrm>
+          <a:prstGeom prst="rect">
+            <a:avLst/>
+          </a:prstGeom>
+        </p:spPr>
+      </p:pic>
       <p:cxnSp>
         <p:nvCxnSpPr>
-          <p:cNvPr id="6" name="Straight Connector 5">
+          <p:cNvPr id="2" name="Straight Connector 1">
             <a:extLst>
               <a:ext uri="{FF2B5EF4-FFF2-40B4-BE49-F238E27FC236}">
-                <a16:creationId xmlns:a16="http://schemas.microsoft.com/office/drawing/2014/main" id="{57EE24B8-E8D2-47F2-99A9-A05BC00D7DC7}"/>
+                <a16:creationId xmlns:a16="http://schemas.microsoft.com/office/drawing/2014/main" id="{011F6D1A-9FA6-43CE-A772-18221EFBBAE9}"/>
               </a:ext>
             </a:extLst>
           </p:cNvPr>
@@ -3249,105 +3311,12 @@
           </a:fontRef>
         </p:style>
       </p:cxnSp>
-      <p:sp>
-        <p:nvSpPr>
-          <p:cNvPr id="10" name="TextBox 9">
-            <a:extLst>
-              <a:ext uri="{FF2B5EF4-FFF2-40B4-BE49-F238E27FC236}">
-                <a16:creationId xmlns:a16="http://schemas.microsoft.com/office/drawing/2014/main" id="{B354DA9C-2313-40D7-87D0-268051616CAD}"/>
-              </a:ext>
-            </a:extLst>
-          </p:cNvPr>
-          <p:cNvSpPr txBox="1"/>
-          <p:nvPr/>
-        </p:nvSpPr>
-        <p:spPr>
-          <a:xfrm>
-            <a:off x="2556902" y="1227340"/>
-            <a:ext cx="6886403" cy="3347840"/>
-          </a:xfrm>
-          <a:prstGeom prst="rect">
-            <a:avLst/>
-          </a:prstGeom>
-          <a:noFill/>
-        </p:spPr>
-        <p:txBody>
-          <a:bodyPr wrap="square" rtlCol="0">
-            <a:spAutoFit/>
-          </a:bodyPr>
-          <a:lstStyle/>
-          <a:p>
-            <a:pPr algn="ctr"/>
-            <a:endParaRPr lang="en-US" sz="2400" b="1" dirty="0">
-              <a:latin typeface="Times New Roman" panose="02020603050405020304" pitchFamily="18" charset="0"/>
-              <a:cs typeface="Times New Roman" panose="02020603050405020304" pitchFamily="18" charset="0"/>
-            </a:endParaRPr>
-          </a:p>
-          <a:p>
-            <a:pPr algn="ctr"/>
-            <a:r>
-              <a:rPr lang="en-US" sz="4400" b="1" dirty="0">
-                <a:latin typeface="Times New Roman" panose="02020603050405020304" pitchFamily="18" charset="0"/>
-                <a:cs typeface="Times New Roman" panose="02020603050405020304" pitchFamily="18" charset="0"/>
-              </a:rPr>
-              <a:t>Laser Pathing Program </a:t>
-            </a:r>
-          </a:p>
-          <a:p>
-            <a:pPr algn="ctr"/>
-            <a:r>
-              <a:rPr lang="en-US" sz="4400" b="1" dirty="0">
-                <a:latin typeface="Times New Roman" panose="02020603050405020304" pitchFamily="18" charset="0"/>
-                <a:cs typeface="Times New Roman" panose="02020603050405020304" pitchFamily="18" charset="0"/>
-              </a:rPr>
-              <a:t>in Progress</a:t>
-            </a:r>
-          </a:p>
-          <a:p>
-            <a:pPr algn="ctr"/>
-            <a:endParaRPr lang="en-US" sz="2400" b="1" dirty="0">
-              <a:latin typeface="Times New Roman" panose="02020603050405020304" pitchFamily="18" charset="0"/>
-              <a:cs typeface="Times New Roman" panose="02020603050405020304" pitchFamily="18" charset="0"/>
-            </a:endParaRPr>
-          </a:p>
-          <a:p>
-            <a:pPr algn="ctr"/>
-            <a:r>
-              <a:rPr lang="en-US" sz="2400" b="1" dirty="0">
-                <a:latin typeface="Times New Roman" panose="02020603050405020304" pitchFamily="18" charset="0"/>
-                <a:cs typeface="Times New Roman" panose="02020603050405020304" pitchFamily="18" charset="0"/>
-              </a:rPr>
-              <a:t>Do not enter when sign is displayed.</a:t>
-            </a:r>
-          </a:p>
-          <a:p>
-            <a:pPr algn="ctr"/>
-            <a:endParaRPr lang="en-US" b="1" dirty="0">
-              <a:latin typeface="Times New Roman" panose="02020603050405020304" pitchFamily="18" charset="0"/>
-              <a:cs typeface="Times New Roman" panose="02020603050405020304" pitchFamily="18" charset="0"/>
-            </a:endParaRPr>
-          </a:p>
-          <a:p>
-            <a:pPr algn="ctr"/>
-            <a:endParaRPr lang="en-US" b="1" dirty="0">
-              <a:latin typeface="Times New Roman" panose="02020603050405020304" pitchFamily="18" charset="0"/>
-              <a:cs typeface="Times New Roman" panose="02020603050405020304" pitchFamily="18" charset="0"/>
-            </a:endParaRPr>
-          </a:p>
-          <a:p>
-            <a:endParaRPr lang="en-US" sz="1155" dirty="0">
-              <a:latin typeface="Arial Black" panose="020B0A04020102020204" pitchFamily="34" charset="0"/>
-              <a:cs typeface="Arial" panose="020B0604020202020204" pitchFamily="34" charset="0"/>
-            </a:endParaRPr>
-          </a:p>
-        </p:txBody>
-      </p:sp>
       <p:pic>
         <p:nvPicPr>
-          <p:cNvPr id="13" name="Picture 12" descr="A close up of a sign&#10;&#10;Description automatically generated">
+          <p:cNvPr id="5" name="Picture 4" descr="A picture containing drawing&#10;&#10;Description automatically generated">
             <a:extLst>
               <a:ext uri="{FF2B5EF4-FFF2-40B4-BE49-F238E27FC236}">
-                <a16:creationId xmlns:a16="http://schemas.microsoft.com/office/drawing/2014/main" id="{2E1A5342-253C-43BB-9455-6599A5D03AB6}"/>
+                <a16:creationId xmlns:a16="http://schemas.microsoft.com/office/drawing/2014/main" id="{37D5321C-F32E-4742-A01A-7C5DD8BF9174}"/>
               </a:ext>
             </a:extLst>
           </p:cNvPr>
@@ -3358,6 +3327,16 @@
         </p:nvPicPr>
         <p:blipFill>
           <a:blip r:embed="rId5">
+            <a:clrChange>
+              <a:clrFrom>
+                <a:srgbClr val="FFFF01"/>
+              </a:clrFrom>
+              <a:clrTo>
+                <a:srgbClr val="FFFF01">
+                  <a:alpha val="0"/>
+                </a:srgbClr>
+              </a:clrTo>
+            </a:clrChange>
             <a:extLst>
               <a:ext uri="{28A0092B-C50C-407E-A947-70E740481C1C}">
                 <a14:useLocalDpi xmlns:a14="http://schemas.microsoft.com/office/drawing/2010/main" val="0"/>
@@ -3370,206 +3349,18 @@
         </p:blipFill>
         <p:spPr>
           <a:xfrm>
-            <a:off x="54445" y="2073654"/>
-            <a:ext cx="2465985" cy="2178432"/>
+            <a:off x="723912" y="166363"/>
+            <a:ext cx="1127050" cy="980679"/>
           </a:xfrm>
           <a:prstGeom prst="rect">
             <a:avLst/>
           </a:prstGeom>
         </p:spPr>
       </p:pic>
-      <p:sp>
-        <p:nvSpPr>
-          <p:cNvPr id="5" name="Rectangle 4">
-            <a:extLst>
-              <a:ext uri="{FF2B5EF4-FFF2-40B4-BE49-F238E27FC236}">
-                <a16:creationId xmlns:a16="http://schemas.microsoft.com/office/drawing/2014/main" id="{B42A206D-A4B1-48C4-B6F5-32ABA2ED9385}"/>
-              </a:ext>
-            </a:extLst>
-          </p:cNvPr>
-          <p:cNvSpPr/>
-          <p:nvPr/>
-        </p:nvSpPr>
-        <p:spPr>
-          <a:xfrm>
-            <a:off x="6621964" y="3875563"/>
-            <a:ext cx="2522036" cy="1077218"/>
-          </a:xfrm>
-          <a:prstGeom prst="rect">
-            <a:avLst/>
-          </a:prstGeom>
-          <a:noFill/>
-        </p:spPr>
-        <p:txBody>
-          <a:bodyPr wrap="none" lIns="91440" tIns="45720" rIns="91440" bIns="45720">
-            <a:spAutoFit/>
-          </a:bodyPr>
-          <a:lstStyle/>
-          <a:p>
-            <a:pPr algn="ctr"/>
-            <a:r>
-              <a:rPr lang="en-US" sz="3200" b="1" cap="none" spc="0" dirty="0">
-                <a:ln w="12700">
-                  <a:solidFill>
-                    <a:schemeClr val="tx2">
-                      <a:lumMod val="75000"/>
-                    </a:schemeClr>
-                  </a:solidFill>
-                  <a:prstDash val="solid"/>
-                </a:ln>
-                <a:pattFill prst="dkUpDiag">
-                  <a:fgClr>
-                    <a:schemeClr val="tx2"/>
-                  </a:fgClr>
-                  <a:bgClr>
-                    <a:schemeClr val="tx2">
-                      <a:lumMod val="20000"/>
-                      <a:lumOff val="80000"/>
-                    </a:schemeClr>
-                  </a:bgClr>
-                </a:pattFill>
-                <a:effectLst>
-                  <a:outerShdw dist="38100" dir="2640000" algn="bl" rotWithShape="0">
-                    <a:schemeClr val="tx2">
-                      <a:lumMod val="75000"/>
-                    </a:schemeClr>
-                  </a:outerShdw>
-                </a:effectLst>
-              </a:rPr>
-              <a:t>Shutter ON</a:t>
-            </a:r>
-          </a:p>
-          <a:p>
-            <a:pPr algn="ctr"/>
-            <a:r>
-              <a:rPr lang="en-US" sz="3200" b="1" dirty="0">
-                <a:ln w="12700">
-                  <a:solidFill>
-                    <a:schemeClr val="tx2">
-                      <a:lumMod val="75000"/>
-                    </a:schemeClr>
-                  </a:solidFill>
-                  <a:prstDash val="solid"/>
-                </a:ln>
-                <a:pattFill prst="dkUpDiag">
-                  <a:fgClr>
-                    <a:schemeClr val="tx2"/>
-                  </a:fgClr>
-                  <a:bgClr>
-                    <a:schemeClr val="tx2">
-                      <a:lumMod val="20000"/>
-                      <a:lumOff val="80000"/>
-                    </a:schemeClr>
-                  </a:bgClr>
-                </a:pattFill>
-                <a:effectLst>
-                  <a:outerShdw dist="38100" dir="2640000" algn="bl" rotWithShape="0">
-                    <a:schemeClr val="tx2">
-                      <a:lumMod val="75000"/>
-                    </a:schemeClr>
-                  </a:outerShdw>
-                </a:effectLst>
-              </a:rPr>
-              <a:t>Threshold ON</a:t>
-            </a:r>
-            <a:endParaRPr lang="en-US" sz="3200" b="1" cap="none" spc="0" dirty="0">
-              <a:ln w="12700">
-                <a:solidFill>
-                  <a:schemeClr val="tx2">
-                    <a:lumMod val="75000"/>
-                  </a:schemeClr>
-                </a:solidFill>
-                <a:prstDash val="solid"/>
-              </a:ln>
-              <a:pattFill prst="dkUpDiag">
-                <a:fgClr>
-                  <a:schemeClr val="tx2"/>
-                </a:fgClr>
-                <a:bgClr>
-                  <a:schemeClr val="tx2">
-                    <a:lumMod val="20000"/>
-                    <a:lumOff val="80000"/>
-                  </a:schemeClr>
-                </a:bgClr>
-              </a:pattFill>
-              <a:effectLst>
-                <a:outerShdw dist="38100" dir="2640000" algn="bl" rotWithShape="0">
-                  <a:schemeClr val="tx2">
-                    <a:lumMod val="75000"/>
-                  </a:schemeClr>
-                </a:outerShdw>
-              </a:effectLst>
-            </a:endParaRPr>
-          </a:p>
-        </p:txBody>
-      </p:sp>
-      <p:sp>
-        <p:nvSpPr>
-          <p:cNvPr id="7" name="Rectangle 6">
-            <a:extLst>
-              <a:ext uri="{FF2B5EF4-FFF2-40B4-BE49-F238E27FC236}">
-                <a16:creationId xmlns:a16="http://schemas.microsoft.com/office/drawing/2014/main" id="{AE63A58D-0C07-4143-A280-2D400B8F93BF}"/>
-              </a:ext>
-            </a:extLst>
-          </p:cNvPr>
-          <p:cNvSpPr/>
-          <p:nvPr/>
-        </p:nvSpPr>
-        <p:spPr>
-          <a:xfrm>
-            <a:off x="2820505" y="4373925"/>
-            <a:ext cx="3586624" cy="584775"/>
-          </a:xfrm>
-          <a:prstGeom prst="rect">
-            <a:avLst/>
-          </a:prstGeom>
-          <a:noFill/>
-        </p:spPr>
-        <p:txBody>
-          <a:bodyPr wrap="none" lIns="91440" tIns="45720" rIns="91440" bIns="45720">
-            <a:spAutoFit/>
-          </a:bodyPr>
-          <a:lstStyle/>
-          <a:p>
-            <a:pPr algn="ctr"/>
-            <a:r>
-              <a:rPr lang="en-US" sz="3200" b="1" cap="none" spc="0" dirty="0">
-                <a:ln w="12700">
-                  <a:solidFill>
-                    <a:schemeClr val="tx2">
-                      <a:lumMod val="75000"/>
-                    </a:schemeClr>
-                  </a:solidFill>
-                  <a:prstDash val="solid"/>
-                </a:ln>
-                <a:pattFill prst="dkUpDiag">
-                  <a:fgClr>
-                    <a:schemeClr val="tx2"/>
-                  </a:fgClr>
-                  <a:bgClr>
-                    <a:schemeClr val="tx2">
-                      <a:lumMod val="20000"/>
-                      <a:lumOff val="80000"/>
-                    </a:schemeClr>
-                  </a:bgClr>
-                </a:pattFill>
-                <a:effectLst>
-                  <a:outerShdw dist="38100" dir="2640000" algn="bl" rotWithShape="0">
-                    <a:schemeClr val="tx2">
-                      <a:lumMod val="75000"/>
-                    </a:schemeClr>
-                  </a:outerShdw>
-                </a:effectLst>
-              </a:rPr>
-              <a:t>Program in Progress</a:t>
-            </a:r>
-          </a:p>
-        </p:txBody>
-      </p:sp>
     </p:spTree>
     <p:extLst>
       <p:ext uri="{BB962C8B-B14F-4D97-AF65-F5344CB8AC3E}">
-        <p14:creationId xmlns:p14="http://schemas.microsoft.com/office/powerpoint/2010/main" val="3304905312"/>
+        <p14:creationId xmlns:p14="http://schemas.microsoft.com/office/powerpoint/2010/main" val="3055451120"/>
       </p:ext>
     </p:extLst>
   </p:cSld>
@@ -3832,7 +3623,7 @@
         <p:spPr>
           <a:xfrm>
             <a:off x="2626469" y="1227340"/>
-            <a:ext cx="6517531" cy="830997"/>
+            <a:ext cx="6517531" cy="1569660"/>
           </a:xfrm>
           <a:prstGeom prst="rect">
             <a:avLst/>
@@ -3844,6 +3635,13 @@
             <a:spAutoFit/>
           </a:bodyPr>
           <a:lstStyle/>
+          <a:p>
+            <a:pPr algn="ctr"/>
+            <a:endParaRPr lang="en-US" sz="4800" b="1" dirty="0">
+              <a:latin typeface="Times New Roman" panose="02020603050405020304" pitchFamily="18" charset="0"/>
+              <a:cs typeface="Times New Roman" panose="02020603050405020304" pitchFamily="18" charset="0"/>
+            </a:endParaRPr>
+          </a:p>
           <a:p>
             <a:pPr algn="ctr"/>
             <a:r>
@@ -4023,81 +3821,41 @@
           </a:p>
         </p:txBody>
       </p:sp>
-      <p:grpSp>
-        <p:nvGrpSpPr>
-          <p:cNvPr id="3" name="Group 2">
+      <p:sp>
+        <p:nvSpPr>
+          <p:cNvPr id="11" name="Rectangle 10">
             <a:extLst>
               <a:ext uri="{FF2B5EF4-FFF2-40B4-BE49-F238E27FC236}">
-                <a16:creationId xmlns:a16="http://schemas.microsoft.com/office/drawing/2014/main" id="{6AB65601-AE1B-48A9-BA89-80324E082538}"/>
+                <a16:creationId xmlns:a16="http://schemas.microsoft.com/office/drawing/2014/main" id="{406725B8-744B-484A-BCF6-CC97C3BA171C}"/>
               </a:ext>
             </a:extLst>
           </p:cNvPr>
-          <p:cNvGrpSpPr/>
+          <p:cNvSpPr/>
           <p:nvPr/>
-        </p:nvGrpSpPr>
-        <p:grpSpPr>
-          <a:xfrm>
-            <a:off x="722975" y="156915"/>
-            <a:ext cx="8293211" cy="953374"/>
-            <a:chOff x="956581" y="1806915"/>
-            <a:chExt cx="11063101" cy="1801810"/>
-          </a:xfrm>
-        </p:grpSpPr>
-        <p:sp>
-          <p:nvSpPr>
-            <p:cNvPr id="11" name="Rectangle 10">
-              <a:extLst>
-                <a:ext uri="{FF2B5EF4-FFF2-40B4-BE49-F238E27FC236}">
-                  <a16:creationId xmlns:a16="http://schemas.microsoft.com/office/drawing/2014/main" id="{406725B8-744B-484A-BCF6-CC97C3BA171C}"/>
-                </a:ext>
-              </a:extLst>
-            </p:cNvPr>
-            <p:cNvSpPr/>
-            <p:nvPr/>
-          </p:nvSpPr>
-          <p:spPr>
-            <a:xfrm>
-              <a:off x="2828298" y="1894235"/>
-              <a:ext cx="9191384" cy="1714490"/>
-            </a:xfrm>
-            <a:prstGeom prst="rect">
-              <a:avLst/>
-            </a:prstGeom>
-            <a:noFill/>
-          </p:spPr>
-          <p:txBody>
-            <a:bodyPr wrap="square" lIns="75438" tIns="37719" rIns="75438" bIns="37719">
-              <a:spAutoFit/>
-            </a:bodyPr>
-            <a:lstStyle/>
-            <a:p>
-              <a:pPr algn="ctr">
-                <a:tabLst>
-                  <a:tab pos="5830888" algn="l"/>
-                </a:tabLst>
-              </a:pPr>
-              <a:r>
-                <a:rPr lang="en-US" sz="5400" b="1" dirty="0">
-                  <a:ln w="10160">
-                    <a:noFill/>
-                    <a:prstDash val="solid"/>
-                  </a:ln>
-                  <a:solidFill>
-                    <a:srgbClr val="FFFFFF"/>
-                  </a:solidFill>
-                  <a:effectLst>
-                    <a:outerShdw blurRad="38100" dist="22860" dir="5400000" algn="tl" rotWithShape="0">
-                      <a:srgbClr val="000000">
-                        <a:alpha val="30000"/>
-                      </a:srgbClr>
-                    </a:outerShdw>
-                  </a:effectLst>
-                  <a:latin typeface="Times New Roman" panose="02020603050405020304" pitchFamily="18" charset="0"/>
-                  <a:cs typeface="Times New Roman" panose="02020603050405020304" pitchFamily="18" charset="0"/>
-                </a:rPr>
-                <a:t>DANGER</a:t>
-              </a:r>
-              <a:endParaRPr lang="en-US" sz="8800" b="1" dirty="0">
+        </p:nvSpPr>
+        <p:spPr>
+          <a:xfrm>
+            <a:off x="2126067" y="203118"/>
+            <a:ext cx="6890119" cy="907171"/>
+          </a:xfrm>
+          <a:prstGeom prst="rect">
+            <a:avLst/>
+          </a:prstGeom>
+          <a:noFill/>
+        </p:spPr>
+        <p:txBody>
+          <a:bodyPr wrap="square" lIns="75438" tIns="37719" rIns="75438" bIns="37719">
+            <a:spAutoFit/>
+          </a:bodyPr>
+          <a:lstStyle/>
+          <a:p>
+            <a:pPr algn="ctr">
+              <a:tabLst>
+                <a:tab pos="5830888" algn="l"/>
+              </a:tabLst>
+            </a:pPr>
+            <a:r>
+              <a:rPr lang="en-US" sz="5400" b="1" dirty="0">
                 <a:ln w="10160">
                   <a:noFill/>
                   <a:prstDash val="solid"/>
@@ -4114,47 +3872,30 @@
                 </a:effectLst>
                 <a:latin typeface="Times New Roman" panose="02020603050405020304" pitchFamily="18" charset="0"/>
                 <a:cs typeface="Times New Roman" panose="02020603050405020304" pitchFamily="18" charset="0"/>
-              </a:endParaRPr>
-            </a:p>
-          </p:txBody>
-        </p:sp>
-        <p:pic>
-          <p:nvPicPr>
-            <p:cNvPr id="22" name="Picture 21" descr="A close up of a sign&#10;&#10;Description automatically generated">
-              <a:extLst>
-                <a:ext uri="{FF2B5EF4-FFF2-40B4-BE49-F238E27FC236}">
-                  <a16:creationId xmlns:a16="http://schemas.microsoft.com/office/drawing/2014/main" id="{01BB75ED-952E-42D6-A38D-87B08CA4B753}"/>
-                </a:ext>
-              </a:extLst>
-            </p:cNvPr>
-            <p:cNvPicPr>
-              <a:picLocks noChangeAspect="1"/>
-            </p:cNvPicPr>
-            <p:nvPr/>
-          </p:nvPicPr>
-          <p:blipFill>
-            <a:blip r:embed="rId2">
-              <a:extLst>
-                <a:ext uri="{28A0092B-C50C-407E-A947-70E740481C1C}">
-                  <a14:useLocalDpi xmlns:a14="http://schemas.microsoft.com/office/drawing/2010/main" val="0"/>
-                </a:ext>
-              </a:extLst>
-            </a:blip>
-            <a:stretch>
-              <a:fillRect/>
-            </a:stretch>
-          </p:blipFill>
-          <p:spPr>
-            <a:xfrm>
-              <a:off x="956581" y="1806915"/>
-              <a:ext cx="1505979" cy="1714490"/>
-            </a:xfrm>
-            <a:prstGeom prst="rect">
-              <a:avLst/>
-            </a:prstGeom>
-          </p:spPr>
-        </p:pic>
-      </p:grpSp>
+              </a:rPr>
+              <a:t>DANGER</a:t>
+            </a:r>
+            <a:endParaRPr lang="en-US" sz="8800" b="1" dirty="0">
+              <a:ln w="10160">
+                <a:noFill/>
+                <a:prstDash val="solid"/>
+              </a:ln>
+              <a:solidFill>
+                <a:srgbClr val="FFFFFF"/>
+              </a:solidFill>
+              <a:effectLst>
+                <a:outerShdw blurRad="38100" dist="22860" dir="5400000" algn="tl" rotWithShape="0">
+                  <a:srgbClr val="000000">
+                    <a:alpha val="30000"/>
+                  </a:srgbClr>
+                </a:outerShdw>
+              </a:effectLst>
+              <a:latin typeface="Times New Roman" panose="02020603050405020304" pitchFamily="18" charset="0"/>
+              <a:cs typeface="Times New Roman" panose="02020603050405020304" pitchFamily="18" charset="0"/>
+            </a:endParaRPr>
+          </a:p>
+        </p:txBody>
+      </p:sp>
       <p:pic>
         <p:nvPicPr>
           <p:cNvPr id="24" name="Picture 23">
@@ -4170,13 +3911,13 @@
           <p:nvPr/>
         </p:nvPicPr>
         <p:blipFill>
-          <a:blip r:embed="rId3">
+          <a:blip r:embed="rId2">
             <a:extLst>
               <a:ext uri="{28A0092B-C50C-407E-A947-70E740481C1C}">
                 <a14:useLocalDpi xmlns:a14="http://schemas.microsoft.com/office/drawing/2010/main" val="0"/>
               </a:ext>
               <a:ext uri="{96DAC541-7B7A-43D3-8B79-37D633B846F1}">
-                <asvg:svgBlip xmlns:asvg="http://schemas.microsoft.com/office/drawing/2016/SVG/main" r:embed="rId4"/>
+                <asvg:svgBlip xmlns:asvg="http://schemas.microsoft.com/office/drawing/2016/SVG/main" r:embed="rId3"/>
               </a:ext>
             </a:extLst>
           </a:blip>
@@ -4234,7 +3975,7 @@
                 <a:latin typeface="Times New Roman" panose="02020603050405020304" pitchFamily="18" charset="0"/>
                 <a:cs typeface="Times New Roman" panose="02020603050405020304" pitchFamily="18" charset="0"/>
               </a:rPr>
-              <a:t>Laser Firing</a:t>
+              <a:t>Pilot Laser Firing</a:t>
             </a:r>
           </a:p>
           <a:p>
@@ -4251,7 +3992,7 @@
                 <a:latin typeface="Times New Roman" panose="02020603050405020304" pitchFamily="18" charset="0"/>
                 <a:cs typeface="Times New Roman" panose="02020603050405020304" pitchFamily="18" charset="0"/>
               </a:rPr>
-              <a:t>Do not enter when sign is displayed.</a:t>
+              <a:t>Do not enter laser chamber.</a:t>
             </a:r>
           </a:p>
           <a:p>
@@ -4291,7 +4032,7 @@
           <p:nvPr/>
         </p:nvPicPr>
         <p:blipFill>
-          <a:blip r:embed="rId5">
+          <a:blip r:embed="rId4">
             <a:extLst>
               <a:ext uri="{28A0092B-C50C-407E-A947-70E740481C1C}">
                 <a14:useLocalDpi xmlns:a14="http://schemas.microsoft.com/office/drawing/2010/main" val="0"/>
@@ -4317,7 +4058,7 @@
           <p:cNvPr id="2" name="Straight Connector 1">
             <a:extLst>
               <a:ext uri="{FF2B5EF4-FFF2-40B4-BE49-F238E27FC236}">
-                <a16:creationId xmlns:a16="http://schemas.microsoft.com/office/drawing/2014/main" id="{011F6D1A-9FA6-43CE-A772-18221EFBBAE9}"/>
+                <a16:creationId xmlns:a16="http://schemas.microsoft.com/office/drawing/2014/main" id="{3F2ED4A5-6EBE-4708-A038-A748D6CA850C}"/>
               </a:ext>
             </a:extLst>
           </p:cNvPr>
@@ -4355,10 +4096,56 @@
           </a:fontRef>
         </p:style>
       </p:cxnSp>
+      <p:pic>
+        <p:nvPicPr>
+          <p:cNvPr id="5" name="Picture 4" descr="A picture containing drawing&#10;&#10;Description automatically generated">
+            <a:extLst>
+              <a:ext uri="{FF2B5EF4-FFF2-40B4-BE49-F238E27FC236}">
+                <a16:creationId xmlns:a16="http://schemas.microsoft.com/office/drawing/2014/main" id="{1D4832EF-FCFE-4714-AD23-C611B5D89174}"/>
+              </a:ext>
+            </a:extLst>
+          </p:cNvPr>
+          <p:cNvPicPr>
+            <a:picLocks noChangeAspect="1"/>
+          </p:cNvPicPr>
+          <p:nvPr/>
+        </p:nvPicPr>
+        <p:blipFill>
+          <a:blip r:embed="rId5">
+            <a:clrChange>
+              <a:clrFrom>
+                <a:srgbClr val="FFFF01"/>
+              </a:clrFrom>
+              <a:clrTo>
+                <a:srgbClr val="FFFF01">
+                  <a:alpha val="0"/>
+                </a:srgbClr>
+              </a:clrTo>
+            </a:clrChange>
+            <a:extLst>
+              <a:ext uri="{28A0092B-C50C-407E-A947-70E740481C1C}">
+                <a14:useLocalDpi xmlns:a14="http://schemas.microsoft.com/office/drawing/2010/main" val="0"/>
+              </a:ext>
+            </a:extLst>
+          </a:blip>
+          <a:stretch>
+            <a:fillRect/>
+          </a:stretch>
+        </p:blipFill>
+        <p:spPr>
+          <a:xfrm>
+            <a:off x="723912" y="166363"/>
+            <a:ext cx="1127050" cy="980679"/>
+          </a:xfrm>
+          <a:prstGeom prst="rect">
+            <a:avLst/>
+          </a:prstGeom>
+        </p:spPr>
+      </p:pic>
     </p:spTree>
     <p:extLst>
       <p:ext uri="{BB962C8B-B14F-4D97-AF65-F5344CB8AC3E}">
-        <p14:creationId xmlns:p14="http://schemas.microsoft.com/office/powerpoint/2010/main" val="3055451120"/>
+        <p14:creationId xmlns:p14="http://schemas.microsoft.com/office/powerpoint/2010/main" val="190637029"/>
       </p:ext>
     </p:extLst>
   </p:cSld>
@@ -4406,422 +4193,6 @@
             <a:avLst/>
           </a:prstGeom>
           <a:solidFill>
-            <a:srgbClr val="FF0000"/>
-          </a:solidFill>
-          <a:ln>
-            <a:solidFill>
-              <a:srgbClr val="FF0000"/>
-            </a:solidFill>
-          </a:ln>
-        </p:spPr>
-        <p:style>
-          <a:lnRef idx="2">
-            <a:schemeClr val="accent1">
-              <a:shade val="50000"/>
-            </a:schemeClr>
-          </a:lnRef>
-          <a:fillRef idx="1">
-            <a:schemeClr val="accent1"/>
-          </a:fillRef>
-          <a:effectRef idx="0">
-            <a:schemeClr val="accent1"/>
-          </a:effectRef>
-          <a:fontRef idx="minor">
-            <a:schemeClr val="lt1"/>
-          </a:fontRef>
-        </p:style>
-        <p:txBody>
-          <a:bodyPr rtlCol="0" anchor="ctr"/>
-          <a:lstStyle/>
-          <a:p>
-            <a:pPr algn="ctr"/>
-            <a:endParaRPr lang="en-US" sz="1485"/>
-          </a:p>
-        </p:txBody>
-      </p:sp>
-      <p:grpSp>
-        <p:nvGrpSpPr>
-          <p:cNvPr id="3" name="Group 2">
-            <a:extLst>
-              <a:ext uri="{FF2B5EF4-FFF2-40B4-BE49-F238E27FC236}">
-                <a16:creationId xmlns:a16="http://schemas.microsoft.com/office/drawing/2014/main" id="{6AB65601-AE1B-48A9-BA89-80324E082538}"/>
-              </a:ext>
-            </a:extLst>
-          </p:cNvPr>
-          <p:cNvGrpSpPr/>
-          <p:nvPr/>
-        </p:nvGrpSpPr>
-        <p:grpSpPr>
-          <a:xfrm>
-            <a:off x="722975" y="156915"/>
-            <a:ext cx="8293211" cy="953374"/>
-            <a:chOff x="956581" y="1806915"/>
-            <a:chExt cx="11063101" cy="1801810"/>
-          </a:xfrm>
-        </p:grpSpPr>
-        <p:sp>
-          <p:nvSpPr>
-            <p:cNvPr id="11" name="Rectangle 10">
-              <a:extLst>
-                <a:ext uri="{FF2B5EF4-FFF2-40B4-BE49-F238E27FC236}">
-                  <a16:creationId xmlns:a16="http://schemas.microsoft.com/office/drawing/2014/main" id="{406725B8-744B-484A-BCF6-CC97C3BA171C}"/>
-                </a:ext>
-              </a:extLst>
-            </p:cNvPr>
-            <p:cNvSpPr/>
-            <p:nvPr/>
-          </p:nvSpPr>
-          <p:spPr>
-            <a:xfrm>
-              <a:off x="2828298" y="1894235"/>
-              <a:ext cx="9191384" cy="1714490"/>
-            </a:xfrm>
-            <a:prstGeom prst="rect">
-              <a:avLst/>
-            </a:prstGeom>
-            <a:noFill/>
-          </p:spPr>
-          <p:txBody>
-            <a:bodyPr wrap="square" lIns="75438" tIns="37719" rIns="75438" bIns="37719">
-              <a:spAutoFit/>
-            </a:bodyPr>
-            <a:lstStyle/>
-            <a:p>
-              <a:pPr algn="ctr">
-                <a:tabLst>
-                  <a:tab pos="5830888" algn="l"/>
-                </a:tabLst>
-              </a:pPr>
-              <a:r>
-                <a:rPr lang="en-US" sz="5400" b="1" dirty="0">
-                  <a:ln w="10160">
-                    <a:noFill/>
-                    <a:prstDash val="solid"/>
-                  </a:ln>
-                  <a:solidFill>
-                    <a:srgbClr val="FFFFFF"/>
-                  </a:solidFill>
-                  <a:effectLst>
-                    <a:outerShdw blurRad="38100" dist="22860" dir="5400000" algn="tl" rotWithShape="0">
-                      <a:srgbClr val="000000">
-                        <a:alpha val="30000"/>
-                      </a:srgbClr>
-                    </a:outerShdw>
-                  </a:effectLst>
-                  <a:latin typeface="Times New Roman" panose="02020603050405020304" pitchFamily="18" charset="0"/>
-                  <a:cs typeface="Times New Roman" panose="02020603050405020304" pitchFamily="18" charset="0"/>
-                </a:rPr>
-                <a:t>DANGER</a:t>
-              </a:r>
-              <a:endParaRPr lang="en-US" sz="8800" b="1" dirty="0">
-                <a:ln w="10160">
-                  <a:noFill/>
-                  <a:prstDash val="solid"/>
-                </a:ln>
-                <a:solidFill>
-                  <a:srgbClr val="FFFFFF"/>
-                </a:solidFill>
-                <a:effectLst>
-                  <a:outerShdw blurRad="38100" dist="22860" dir="5400000" algn="tl" rotWithShape="0">
-                    <a:srgbClr val="000000">
-                      <a:alpha val="30000"/>
-                    </a:srgbClr>
-                  </a:outerShdw>
-                </a:effectLst>
-                <a:latin typeface="Times New Roman" panose="02020603050405020304" pitchFamily="18" charset="0"/>
-                <a:cs typeface="Times New Roman" panose="02020603050405020304" pitchFamily="18" charset="0"/>
-              </a:endParaRPr>
-            </a:p>
-          </p:txBody>
-        </p:sp>
-        <p:pic>
-          <p:nvPicPr>
-            <p:cNvPr id="22" name="Picture 21" descr="A close up of a sign&#10;&#10;Description automatically generated">
-              <a:extLst>
-                <a:ext uri="{FF2B5EF4-FFF2-40B4-BE49-F238E27FC236}">
-                  <a16:creationId xmlns:a16="http://schemas.microsoft.com/office/drawing/2014/main" id="{01BB75ED-952E-42D6-A38D-87B08CA4B753}"/>
-                </a:ext>
-              </a:extLst>
-            </p:cNvPr>
-            <p:cNvPicPr>
-              <a:picLocks noChangeAspect="1"/>
-            </p:cNvPicPr>
-            <p:nvPr/>
-          </p:nvPicPr>
-          <p:blipFill>
-            <a:blip r:embed="rId2">
-              <a:extLst>
-                <a:ext uri="{28A0092B-C50C-407E-A947-70E740481C1C}">
-                  <a14:useLocalDpi xmlns:a14="http://schemas.microsoft.com/office/drawing/2010/main" val="0"/>
-                </a:ext>
-              </a:extLst>
-            </a:blip>
-            <a:stretch>
-              <a:fillRect/>
-            </a:stretch>
-          </p:blipFill>
-          <p:spPr>
-            <a:xfrm>
-              <a:off x="956581" y="1806915"/>
-              <a:ext cx="1505979" cy="1714490"/>
-            </a:xfrm>
-            <a:prstGeom prst="rect">
-              <a:avLst/>
-            </a:prstGeom>
-          </p:spPr>
-        </p:pic>
-      </p:grpSp>
-      <p:pic>
-        <p:nvPicPr>
-          <p:cNvPr id="24" name="Picture 23">
-            <a:extLst>
-              <a:ext uri="{FF2B5EF4-FFF2-40B4-BE49-F238E27FC236}">
-                <a16:creationId xmlns:a16="http://schemas.microsoft.com/office/drawing/2014/main" id="{357DA4A6-84F2-45A4-80DA-0781AEB791A2}"/>
-              </a:ext>
-            </a:extLst>
-          </p:cNvPr>
-          <p:cNvPicPr>
-            <a:picLocks noChangeAspect="1"/>
-          </p:cNvPicPr>
-          <p:nvPr/>
-        </p:nvPicPr>
-        <p:blipFill>
-          <a:blip r:embed="rId3">
-            <a:extLst>
-              <a:ext uri="{28A0092B-C50C-407E-A947-70E740481C1C}">
-                <a14:useLocalDpi xmlns:a14="http://schemas.microsoft.com/office/drawing/2010/main" val="0"/>
-              </a:ext>
-              <a:ext uri="{96DAC541-7B7A-43D3-8B79-37D633B846F1}">
-                <asvg:svgBlip xmlns:asvg="http://schemas.microsoft.com/office/drawing/2016/SVG/main" r:embed="rId4"/>
-              </a:ext>
-            </a:extLst>
-          </a:blip>
-          <a:srcRect/>
-          <a:stretch/>
-        </p:blipFill>
-        <p:spPr>
-          <a:xfrm>
-            <a:off x="86265" y="4486188"/>
-            <a:ext cx="1341108" cy="466593"/>
-          </a:xfrm>
-          <a:prstGeom prst="rect">
-            <a:avLst/>
-          </a:prstGeom>
-        </p:spPr>
-      </p:pic>
-      <p:sp>
-        <p:nvSpPr>
-          <p:cNvPr id="10" name="TextBox 9">
-            <a:extLst>
-              <a:ext uri="{FF2B5EF4-FFF2-40B4-BE49-F238E27FC236}">
-                <a16:creationId xmlns:a16="http://schemas.microsoft.com/office/drawing/2014/main" id="{B354DA9C-2313-40D7-87D0-268051616CAD}"/>
-              </a:ext>
-            </a:extLst>
-          </p:cNvPr>
-          <p:cNvSpPr txBox="1"/>
-          <p:nvPr/>
-        </p:nvSpPr>
-        <p:spPr>
-          <a:xfrm>
-            <a:off x="2626469" y="1227340"/>
-            <a:ext cx="6517531" cy="2793842"/>
-          </a:xfrm>
-          <a:prstGeom prst="rect">
-            <a:avLst/>
-          </a:prstGeom>
-          <a:noFill/>
-        </p:spPr>
-        <p:txBody>
-          <a:bodyPr wrap="square" rtlCol="0">
-            <a:spAutoFit/>
-          </a:bodyPr>
-          <a:lstStyle/>
-          <a:p>
-            <a:pPr algn="ctr"/>
-            <a:endParaRPr lang="en-US" sz="2000" b="1" dirty="0">
-              <a:latin typeface="Times New Roman" panose="02020603050405020304" pitchFamily="18" charset="0"/>
-              <a:cs typeface="Times New Roman" panose="02020603050405020304" pitchFamily="18" charset="0"/>
-            </a:endParaRPr>
-          </a:p>
-          <a:p>
-            <a:pPr algn="ctr"/>
-            <a:r>
-              <a:rPr lang="en-US" sz="4800" b="1" dirty="0">
-                <a:latin typeface="Times New Roman" panose="02020603050405020304" pitchFamily="18" charset="0"/>
-                <a:cs typeface="Times New Roman" panose="02020603050405020304" pitchFamily="18" charset="0"/>
-              </a:rPr>
-              <a:t>Pilot Laser Firing</a:t>
-            </a:r>
-          </a:p>
-          <a:p>
-            <a:pPr algn="ctr"/>
-            <a:endParaRPr lang="en-US" sz="2800" b="1" dirty="0">
-              <a:latin typeface="Times New Roman" panose="02020603050405020304" pitchFamily="18" charset="0"/>
-              <a:cs typeface="Times New Roman" panose="02020603050405020304" pitchFamily="18" charset="0"/>
-            </a:endParaRPr>
-          </a:p>
-          <a:p>
-            <a:pPr algn="ctr"/>
-            <a:r>
-              <a:rPr lang="en-US" sz="2800" b="1" dirty="0">
-                <a:latin typeface="Times New Roman" panose="02020603050405020304" pitchFamily="18" charset="0"/>
-                <a:cs typeface="Times New Roman" panose="02020603050405020304" pitchFamily="18" charset="0"/>
-              </a:rPr>
-              <a:t>Do not enter when sign is displayed.</a:t>
-            </a:r>
-          </a:p>
-          <a:p>
-            <a:pPr algn="ctr"/>
-            <a:endParaRPr lang="en-US" sz="2000" b="1" dirty="0">
-              <a:latin typeface="Times New Roman" panose="02020603050405020304" pitchFamily="18" charset="0"/>
-              <a:cs typeface="Times New Roman" panose="02020603050405020304" pitchFamily="18" charset="0"/>
-            </a:endParaRPr>
-          </a:p>
-          <a:p>
-            <a:pPr algn="ctr"/>
-            <a:endParaRPr lang="en-US" sz="2000" b="1" dirty="0">
-              <a:latin typeface="Times New Roman" panose="02020603050405020304" pitchFamily="18" charset="0"/>
-              <a:cs typeface="Times New Roman" panose="02020603050405020304" pitchFamily="18" charset="0"/>
-            </a:endParaRPr>
-          </a:p>
-          <a:p>
-            <a:endParaRPr lang="en-US" sz="1155" dirty="0">
-              <a:latin typeface="Arial Black" panose="020B0A04020102020204" pitchFamily="34" charset="0"/>
-              <a:cs typeface="Arial" panose="020B0604020202020204" pitchFamily="34" charset="0"/>
-            </a:endParaRPr>
-          </a:p>
-        </p:txBody>
-      </p:sp>
-      <p:pic>
-        <p:nvPicPr>
-          <p:cNvPr id="13" name="Picture 12" descr="A close up of a sign&#10;&#10;Description automatically generated">
-            <a:extLst>
-              <a:ext uri="{FF2B5EF4-FFF2-40B4-BE49-F238E27FC236}">
-                <a16:creationId xmlns:a16="http://schemas.microsoft.com/office/drawing/2014/main" id="{2E1A5342-253C-43BB-9455-6599A5D03AB6}"/>
-              </a:ext>
-            </a:extLst>
-          </p:cNvPr>
-          <p:cNvPicPr>
-            <a:picLocks noChangeAspect="1"/>
-          </p:cNvPicPr>
-          <p:nvPr/>
-        </p:nvPicPr>
-        <p:blipFill>
-          <a:blip r:embed="rId5">
-            <a:extLst>
-              <a:ext uri="{28A0092B-C50C-407E-A947-70E740481C1C}">
-                <a14:useLocalDpi xmlns:a14="http://schemas.microsoft.com/office/drawing/2010/main" val="0"/>
-              </a:ext>
-            </a:extLst>
-          </a:blip>
-          <a:stretch>
-            <a:fillRect/>
-          </a:stretch>
-        </p:blipFill>
-        <p:spPr>
-          <a:xfrm>
-            <a:off x="54445" y="2073654"/>
-            <a:ext cx="2465985" cy="2178432"/>
-          </a:xfrm>
-          <a:prstGeom prst="rect">
-            <a:avLst/>
-          </a:prstGeom>
-        </p:spPr>
-      </p:pic>
-      <p:cxnSp>
-        <p:nvCxnSpPr>
-          <p:cNvPr id="2" name="Straight Connector 1">
-            <a:extLst>
-              <a:ext uri="{FF2B5EF4-FFF2-40B4-BE49-F238E27FC236}">
-                <a16:creationId xmlns:a16="http://schemas.microsoft.com/office/drawing/2014/main" id="{3F2ED4A5-6EBE-4708-A038-A748D6CA850C}"/>
-              </a:ext>
-            </a:extLst>
-          </p:cNvPr>
-          <p:cNvCxnSpPr>
-            <a:cxnSpLocks/>
-          </p:cNvCxnSpPr>
-          <p:nvPr/>
-        </p:nvCxnSpPr>
-        <p:spPr>
-          <a:xfrm>
-            <a:off x="2626470" y="1227340"/>
-            <a:ext cx="0" cy="3916160"/>
-          </a:xfrm>
-          <a:prstGeom prst="line">
-            <a:avLst/>
-          </a:prstGeom>
-          <a:ln w="63500">
-            <a:solidFill>
-              <a:schemeClr val="tx1"/>
-            </a:solidFill>
-          </a:ln>
-        </p:spPr>
-        <p:style>
-          <a:lnRef idx="1">
-            <a:schemeClr val="accent1"/>
-          </a:lnRef>
-          <a:fillRef idx="0">
-            <a:schemeClr val="accent1"/>
-          </a:fillRef>
-          <a:effectRef idx="0">
-            <a:schemeClr val="accent1"/>
-          </a:effectRef>
-          <a:fontRef idx="minor">
-            <a:schemeClr val="tx1"/>
-          </a:fontRef>
-        </p:style>
-      </p:cxnSp>
-    </p:spTree>
-    <p:extLst>
-      <p:ext uri="{BB962C8B-B14F-4D97-AF65-F5344CB8AC3E}">
-        <p14:creationId xmlns:p14="http://schemas.microsoft.com/office/powerpoint/2010/main" val="190637029"/>
-      </p:ext>
-    </p:extLst>
-  </p:cSld>
-  <p:clrMapOvr>
-    <a:masterClrMapping/>
-  </p:clrMapOvr>
-</p:sld>
-</file>
-
-<file path=ppt/slides/slide4.xml><?xml version="1.0" encoding="utf-8"?>
-<p:sld xmlns:a="http://schemas.openxmlformats.org/drawingml/2006/main" xmlns:r="http://schemas.openxmlformats.org/officeDocument/2006/relationships" xmlns:p="http://schemas.openxmlformats.org/presentationml/2006/main">
-  <p:cSld>
-    <p:spTree>
-      <p:nvGrpSpPr>
-        <p:cNvPr id="1" name=""/>
-        <p:cNvGrpSpPr/>
-        <p:nvPr/>
-      </p:nvGrpSpPr>
-      <p:grpSpPr>
-        <a:xfrm>
-          <a:off x="0" y="0"/>
-          <a:ext cx="0" cy="0"/>
-          <a:chOff x="0" y="0"/>
-          <a:chExt cx="0" cy="0"/>
-        </a:xfrm>
-      </p:grpSpPr>
-      <p:sp>
-        <p:nvSpPr>
-          <p:cNvPr id="4" name="Rectangle 3">
-            <a:extLst>
-              <a:ext uri="{FF2B5EF4-FFF2-40B4-BE49-F238E27FC236}">
-                <a16:creationId xmlns:a16="http://schemas.microsoft.com/office/drawing/2014/main" id="{417F69F9-61CC-425E-9EC6-AB45F4FB481E}"/>
-              </a:ext>
-            </a:extLst>
-          </p:cNvPr>
-          <p:cNvSpPr/>
-          <p:nvPr/>
-        </p:nvSpPr>
-        <p:spPr>
-          <a:xfrm>
-            <a:off x="-9832" y="-6338"/>
-            <a:ext cx="9153832" cy="1233678"/>
-          </a:xfrm>
-          <a:prstGeom prst="rect">
-            <a:avLst/>
-          </a:prstGeom>
-          <a:solidFill>
             <a:srgbClr val="FFA500"/>
           </a:solidFill>
           <a:ln>
@@ -5061,7 +4432,7 @@
         <p:spPr>
           <a:xfrm>
             <a:off x="2626469" y="1227340"/>
-            <a:ext cx="6517531" cy="2362955"/>
+            <a:ext cx="6517531" cy="1993623"/>
           </a:xfrm>
           <a:prstGeom prst="rect">
             <a:avLst/>
@@ -5089,13 +4460,6 @@
               </a:rPr>
               <a:t>Defeatable Entry Active</a:t>
             </a:r>
-          </a:p>
-          <a:p>
-            <a:pPr algn="ctr"/>
-            <a:endParaRPr lang="en-US" sz="2400" b="1" dirty="0">
-              <a:latin typeface="Times New Roman" panose="02020603050405020304" pitchFamily="18" charset="0"/>
-              <a:cs typeface="Times New Roman" panose="02020603050405020304" pitchFamily="18" charset="0"/>
-            </a:endParaRPr>
           </a:p>
           <a:p>
             <a:pPr algn="ctr"/>
@@ -5178,7 +4542,7 @@
 </p:sld>
 </file>
 
-<file path=ppt/slides/slide5.xml><?xml version="1.0" encoding="utf-8"?>
+<file path=ppt/slides/slide4.xml><?xml version="1.0" encoding="utf-8"?>
 <p:sld xmlns:a="http://schemas.openxmlformats.org/drawingml/2006/main" xmlns:r="http://schemas.openxmlformats.org/officeDocument/2006/relationships" xmlns:p="http://schemas.openxmlformats.org/presentationml/2006/main">
   <p:cSld>
     <p:spTree>
@@ -5455,7 +4819,7 @@
         <p:spPr>
           <a:xfrm>
             <a:off x="2626469" y="1227340"/>
-            <a:ext cx="6517531" cy="2362955"/>
+            <a:ext cx="6517531" cy="1993623"/>
           </a:xfrm>
           <a:prstGeom prst="rect">
             <a:avLst/>
@@ -5481,7 +4845,7 @@
                 <a:latin typeface="Times New Roman" panose="02020603050405020304" pitchFamily="18" charset="0"/>
                 <a:cs typeface="Times New Roman" panose="02020603050405020304" pitchFamily="18" charset="0"/>
               </a:rPr>
-              <a:t>System Active</a:t>
+              <a:t>Emergency Stop Active</a:t>
             </a:r>
           </a:p>
           <a:p>
@@ -5493,6 +4857,386 @@
           </a:p>
           <a:p>
             <a:pPr algn="ctr"/>
+            <a:r>
+              <a:rPr lang="en-US" sz="2400" b="1" dirty="0">
+                <a:latin typeface="Times New Roman" panose="02020603050405020304" pitchFamily="18" charset="0"/>
+                <a:cs typeface="Times New Roman" panose="02020603050405020304" pitchFamily="18" charset="0"/>
+              </a:rPr>
+              <a:t>Do not enter laser chamber.</a:t>
+            </a:r>
+          </a:p>
+          <a:p>
+            <a:endParaRPr lang="en-US" sz="1155" dirty="0">
+              <a:latin typeface="Arial Black" panose="020B0A04020102020204" pitchFamily="34" charset="0"/>
+              <a:cs typeface="Arial" panose="020B0604020202020204" pitchFamily="34" charset="0"/>
+            </a:endParaRPr>
+          </a:p>
+        </p:txBody>
+      </p:sp>
+      <p:cxnSp>
+        <p:nvCxnSpPr>
+          <p:cNvPr id="3" name="Straight Connector 2">
+            <a:extLst>
+              <a:ext uri="{FF2B5EF4-FFF2-40B4-BE49-F238E27FC236}">
+                <a16:creationId xmlns:a16="http://schemas.microsoft.com/office/drawing/2014/main" id="{D65F9CAC-52C9-4831-AA6C-7C182F3CDC0F}"/>
+              </a:ext>
+            </a:extLst>
+          </p:cNvPr>
+          <p:cNvCxnSpPr>
+            <a:cxnSpLocks/>
+          </p:cNvCxnSpPr>
+          <p:nvPr/>
+        </p:nvCxnSpPr>
+        <p:spPr>
+          <a:xfrm>
+            <a:off x="2626470" y="1227340"/>
+            <a:ext cx="0" cy="3916160"/>
+          </a:xfrm>
+          <a:prstGeom prst="line">
+            <a:avLst/>
+          </a:prstGeom>
+          <a:ln w="63500">
+            <a:solidFill>
+              <a:schemeClr val="tx1"/>
+            </a:solidFill>
+          </a:ln>
+        </p:spPr>
+        <p:style>
+          <a:lnRef idx="1">
+            <a:schemeClr val="accent1"/>
+          </a:lnRef>
+          <a:fillRef idx="0">
+            <a:schemeClr val="accent1"/>
+          </a:fillRef>
+          <a:effectRef idx="0">
+            <a:schemeClr val="accent1"/>
+          </a:effectRef>
+          <a:fontRef idx="minor">
+            <a:schemeClr val="tx1"/>
+          </a:fontRef>
+        </p:style>
+      </p:cxnSp>
+    </p:spTree>
+    <p:extLst>
+      <p:ext uri="{BB962C8B-B14F-4D97-AF65-F5344CB8AC3E}">
+        <p14:creationId xmlns:p14="http://schemas.microsoft.com/office/powerpoint/2010/main" val="1257675579"/>
+      </p:ext>
+    </p:extLst>
+  </p:cSld>
+  <p:clrMapOvr>
+    <a:masterClrMapping/>
+  </p:clrMapOvr>
+</p:sld>
+</file>
+
+<file path=ppt/slides/slide5.xml><?xml version="1.0" encoding="utf-8"?>
+<p:sld xmlns:a="http://schemas.openxmlformats.org/drawingml/2006/main" xmlns:r="http://schemas.openxmlformats.org/officeDocument/2006/relationships" xmlns:p="http://schemas.openxmlformats.org/presentationml/2006/main">
+  <p:cSld>
+    <p:spTree>
+      <p:nvGrpSpPr>
+        <p:cNvPr id="1" name=""/>
+        <p:cNvGrpSpPr/>
+        <p:nvPr/>
+      </p:nvGrpSpPr>
+      <p:grpSpPr>
+        <a:xfrm>
+          <a:off x="0" y="0"/>
+          <a:ext cx="0" cy="0"/>
+          <a:chOff x="0" y="0"/>
+          <a:chExt cx="0" cy="0"/>
+        </a:xfrm>
+      </p:grpSpPr>
+      <p:sp>
+        <p:nvSpPr>
+          <p:cNvPr id="4" name="Rectangle 3">
+            <a:extLst>
+              <a:ext uri="{FF2B5EF4-FFF2-40B4-BE49-F238E27FC236}">
+                <a16:creationId xmlns:a16="http://schemas.microsoft.com/office/drawing/2014/main" id="{417F69F9-61CC-425E-9EC6-AB45F4FB481E}"/>
+              </a:ext>
+            </a:extLst>
+          </p:cNvPr>
+          <p:cNvSpPr/>
+          <p:nvPr/>
+        </p:nvSpPr>
+        <p:spPr>
+          <a:xfrm>
+            <a:off x="-9832" y="-6338"/>
+            <a:ext cx="9153832" cy="1233678"/>
+          </a:xfrm>
+          <a:prstGeom prst="rect">
+            <a:avLst/>
+          </a:prstGeom>
+          <a:solidFill>
+            <a:srgbClr val="FFA500"/>
+          </a:solidFill>
+          <a:ln>
+            <a:noFill/>
+          </a:ln>
+        </p:spPr>
+        <p:style>
+          <a:lnRef idx="2">
+            <a:schemeClr val="accent1">
+              <a:shade val="50000"/>
+            </a:schemeClr>
+          </a:lnRef>
+          <a:fillRef idx="1">
+            <a:schemeClr val="accent1"/>
+          </a:fillRef>
+          <a:effectRef idx="0">
+            <a:schemeClr val="accent1"/>
+          </a:effectRef>
+          <a:fontRef idx="minor">
+            <a:schemeClr val="lt1"/>
+          </a:fontRef>
+        </p:style>
+        <p:txBody>
+          <a:bodyPr rtlCol="0" anchor="ctr"/>
+          <a:lstStyle/>
+          <a:p>
+            <a:pPr algn="ctr"/>
+            <a:endParaRPr lang="en-US" sz="1485">
+              <a:solidFill>
+                <a:schemeClr val="accent2"/>
+              </a:solidFill>
+            </a:endParaRPr>
+          </a:p>
+        </p:txBody>
+      </p:sp>
+      <p:pic>
+        <p:nvPicPr>
+          <p:cNvPr id="9" name="Picture 8" descr="A close up of a sign&#10;&#10;Description automatically generated">
+            <a:extLst>
+              <a:ext uri="{FF2B5EF4-FFF2-40B4-BE49-F238E27FC236}">
+                <a16:creationId xmlns:a16="http://schemas.microsoft.com/office/drawing/2014/main" id="{70582B24-B17F-4029-9BD5-13C2D74BB238}"/>
+              </a:ext>
+            </a:extLst>
+          </p:cNvPr>
+          <p:cNvPicPr>
+            <a:picLocks noChangeAspect="1"/>
+          </p:cNvPicPr>
+          <p:nvPr/>
+        </p:nvPicPr>
+        <p:blipFill>
+          <a:blip r:embed="rId2">
+            <a:extLst>
+              <a:ext uri="{28A0092B-C50C-407E-A947-70E740481C1C}">
+                <a14:useLocalDpi xmlns:a14="http://schemas.microsoft.com/office/drawing/2010/main" val="0"/>
+              </a:ext>
+            </a:extLst>
+          </a:blip>
+          <a:stretch>
+            <a:fillRect/>
+          </a:stretch>
+        </p:blipFill>
+        <p:spPr>
+          <a:xfrm>
+            <a:off x="54445" y="2073654"/>
+            <a:ext cx="2465985" cy="2178432"/>
+          </a:xfrm>
+          <a:prstGeom prst="rect">
+            <a:avLst/>
+          </a:prstGeom>
+        </p:spPr>
+      </p:pic>
+      <p:sp>
+        <p:nvSpPr>
+          <p:cNvPr id="11" name="Rectangle 10">
+            <a:extLst>
+              <a:ext uri="{FF2B5EF4-FFF2-40B4-BE49-F238E27FC236}">
+                <a16:creationId xmlns:a16="http://schemas.microsoft.com/office/drawing/2014/main" id="{406725B8-744B-484A-BCF6-CC97C3BA171C}"/>
+              </a:ext>
+            </a:extLst>
+          </p:cNvPr>
+          <p:cNvSpPr/>
+          <p:nvPr/>
+        </p:nvSpPr>
+        <p:spPr>
+          <a:xfrm>
+            <a:off x="2175229" y="64583"/>
+            <a:ext cx="6890119" cy="1091837"/>
+          </a:xfrm>
+          <a:prstGeom prst="rect">
+            <a:avLst/>
+          </a:prstGeom>
+          <a:noFill/>
+        </p:spPr>
+        <p:txBody>
+          <a:bodyPr wrap="square" lIns="75438" tIns="37719" rIns="75438" bIns="37719">
+            <a:spAutoFit/>
+          </a:bodyPr>
+          <a:lstStyle/>
+          <a:p>
+            <a:pPr algn="ctr">
+              <a:tabLst>
+                <a:tab pos="5830888" algn="l"/>
+              </a:tabLst>
+            </a:pPr>
+            <a:r>
+              <a:rPr lang="en-US" sz="6600" b="1" dirty="0">
+                <a:ln w="10160">
+                  <a:noFill/>
+                  <a:prstDash val="solid"/>
+                </a:ln>
+                <a:effectLst>
+                  <a:outerShdw blurRad="38100" dist="22860" dir="5400000" algn="tl" rotWithShape="0">
+                    <a:srgbClr val="000000">
+                      <a:alpha val="30000"/>
+                    </a:srgbClr>
+                  </a:outerShdw>
+                </a:effectLst>
+                <a:latin typeface="Times New Roman" panose="02020603050405020304" pitchFamily="18" charset="0"/>
+                <a:cs typeface="Times New Roman" panose="02020603050405020304" pitchFamily="18" charset="0"/>
+              </a:rPr>
+              <a:t>Warning</a:t>
+            </a:r>
+            <a:endParaRPr lang="en-US" sz="11500" b="1" dirty="0">
+              <a:ln w="10160">
+                <a:noFill/>
+                <a:prstDash val="solid"/>
+              </a:ln>
+              <a:effectLst>
+                <a:outerShdw blurRad="38100" dist="22860" dir="5400000" algn="tl" rotWithShape="0">
+                  <a:srgbClr val="000000">
+                    <a:alpha val="30000"/>
+                  </a:srgbClr>
+                </a:outerShdw>
+              </a:effectLst>
+              <a:latin typeface="Times New Roman" panose="02020603050405020304" pitchFamily="18" charset="0"/>
+              <a:cs typeface="Times New Roman" panose="02020603050405020304" pitchFamily="18" charset="0"/>
+            </a:endParaRPr>
+          </a:p>
+        </p:txBody>
+      </p:sp>
+      <p:pic>
+        <p:nvPicPr>
+          <p:cNvPr id="24" name="Picture 23">
+            <a:extLst>
+              <a:ext uri="{FF2B5EF4-FFF2-40B4-BE49-F238E27FC236}">
+                <a16:creationId xmlns:a16="http://schemas.microsoft.com/office/drawing/2014/main" id="{357DA4A6-84F2-45A4-80DA-0781AEB791A2}"/>
+              </a:ext>
+            </a:extLst>
+          </p:cNvPr>
+          <p:cNvPicPr>
+            <a:picLocks noChangeAspect="1"/>
+          </p:cNvPicPr>
+          <p:nvPr/>
+        </p:nvPicPr>
+        <p:blipFill>
+          <a:blip r:embed="rId3">
+            <a:extLst>
+              <a:ext uri="{28A0092B-C50C-407E-A947-70E740481C1C}">
+                <a14:useLocalDpi xmlns:a14="http://schemas.microsoft.com/office/drawing/2010/main" val="0"/>
+              </a:ext>
+              <a:ext uri="{96DAC541-7B7A-43D3-8B79-37D633B846F1}">
+                <asvg:svgBlip xmlns:asvg="http://schemas.microsoft.com/office/drawing/2016/SVG/main" r:embed="rId4"/>
+              </a:ext>
+            </a:extLst>
+          </a:blip>
+          <a:srcRect/>
+          <a:stretch/>
+        </p:blipFill>
+        <p:spPr>
+          <a:xfrm>
+            <a:off x="86265" y="4486188"/>
+            <a:ext cx="1341108" cy="466593"/>
+          </a:xfrm>
+          <a:prstGeom prst="rect">
+            <a:avLst/>
+          </a:prstGeom>
+        </p:spPr>
+      </p:pic>
+      <p:pic>
+        <p:nvPicPr>
+          <p:cNvPr id="2" name="Picture 1" descr="A picture containing drawing&#10;&#10;Description automatically generated">
+            <a:extLst>
+              <a:ext uri="{FF2B5EF4-FFF2-40B4-BE49-F238E27FC236}">
+                <a16:creationId xmlns:a16="http://schemas.microsoft.com/office/drawing/2014/main" id="{C38CC4D0-CE81-4A0D-BF61-CAE3ADE94931}"/>
+              </a:ext>
+            </a:extLst>
+          </p:cNvPr>
+          <p:cNvPicPr>
+            <a:picLocks noChangeAspect="1"/>
+          </p:cNvPicPr>
+          <p:nvPr/>
+        </p:nvPicPr>
+        <p:blipFill>
+          <a:blip r:embed="rId5">
+            <a:clrChange>
+              <a:clrFrom>
+                <a:srgbClr val="FFFF01"/>
+              </a:clrFrom>
+              <a:clrTo>
+                <a:srgbClr val="FFFF01">
+                  <a:alpha val="0"/>
+                </a:srgbClr>
+              </a:clrTo>
+            </a:clrChange>
+            <a:extLst>
+              <a:ext uri="{28A0092B-C50C-407E-A947-70E740481C1C}">
+                <a14:useLocalDpi xmlns:a14="http://schemas.microsoft.com/office/drawing/2010/main" val="0"/>
+              </a:ext>
+            </a:extLst>
+          </a:blip>
+          <a:stretch>
+            <a:fillRect/>
+          </a:stretch>
+        </p:blipFill>
+        <p:spPr>
+          <a:xfrm>
+            <a:off x="723912" y="166363"/>
+            <a:ext cx="1127050" cy="980679"/>
+          </a:xfrm>
+          <a:prstGeom prst="rect">
+            <a:avLst/>
+          </a:prstGeom>
+        </p:spPr>
+      </p:pic>
+      <p:sp>
+        <p:nvSpPr>
+          <p:cNvPr id="13" name="TextBox 12">
+            <a:extLst>
+              <a:ext uri="{FF2B5EF4-FFF2-40B4-BE49-F238E27FC236}">
+                <a16:creationId xmlns:a16="http://schemas.microsoft.com/office/drawing/2014/main" id="{28214289-E8A1-4A29-B016-69C11E0EF571}"/>
+              </a:ext>
+            </a:extLst>
+          </p:cNvPr>
+          <p:cNvSpPr txBox="1"/>
+          <p:nvPr/>
+        </p:nvSpPr>
+        <p:spPr>
+          <a:xfrm>
+            <a:off x="2626469" y="1227340"/>
+            <a:ext cx="6517531" cy="2055178"/>
+          </a:xfrm>
+          <a:prstGeom prst="rect">
+            <a:avLst/>
+          </a:prstGeom>
+          <a:noFill/>
+        </p:spPr>
+        <p:txBody>
+          <a:bodyPr wrap="square" rtlCol="0">
+            <a:spAutoFit/>
+          </a:bodyPr>
+          <a:lstStyle/>
+          <a:p>
+            <a:pPr algn="ctr"/>
+            <a:endParaRPr lang="en-US" sz="2000" b="1" dirty="0">
+              <a:latin typeface="Times New Roman" panose="02020603050405020304" pitchFamily="18" charset="0"/>
+              <a:cs typeface="Times New Roman" panose="02020603050405020304" pitchFamily="18" charset="0"/>
+            </a:endParaRPr>
+          </a:p>
+          <a:p>
+            <a:pPr algn="ctr"/>
+            <a:r>
+              <a:rPr lang="en-US" sz="4800" b="1" dirty="0">
+                <a:latin typeface="Times New Roman" panose="02020603050405020304" pitchFamily="18" charset="0"/>
+                <a:cs typeface="Times New Roman" panose="02020603050405020304" pitchFamily="18" charset="0"/>
+              </a:rPr>
+              <a:t>System Active</a:t>
+            </a:r>
+          </a:p>
+          <a:p>
+            <a:pPr algn="ctr"/>
             <a:endParaRPr lang="en-US" sz="2400" b="1" dirty="0">
               <a:latin typeface="Times New Roman" panose="02020603050405020304" pitchFamily="18" charset="0"/>
               <a:cs typeface="Times New Roman" panose="02020603050405020304" pitchFamily="18" charset="0"/>
@@ -5505,7 +5249,7 @@
                 <a:latin typeface="Times New Roman" panose="02020603050405020304" pitchFamily="18" charset="0"/>
                 <a:cs typeface="Times New Roman" panose="02020603050405020304" pitchFamily="18" charset="0"/>
               </a:rPr>
-              <a:t>Do not enter when sign is displayed.</a:t>
+              <a:t>Do not enter laser chamber.</a:t>
             </a:r>
           </a:p>
           <a:p>
@@ -5603,14 +5347,14 @@
         </p:nvSpPr>
         <p:spPr>
           <a:xfrm>
-            <a:off x="-9832" y="-6338"/>
-            <a:ext cx="9153832" cy="1233678"/>
+            <a:off x="-9833" y="-6338"/>
+            <a:ext cx="9226567" cy="1233678"/>
           </a:xfrm>
           <a:prstGeom prst="rect">
             <a:avLst/>
           </a:prstGeom>
           <a:solidFill>
-            <a:srgbClr val="002060"/>
+            <a:srgbClr val="FFFF00"/>
           </a:solidFill>
           <a:ln>
             <a:noFill/>
@@ -5684,9 +5428,6 @@
                   <a:noFill/>
                   <a:prstDash val="solid"/>
                 </a:ln>
-                <a:solidFill>
-                  <a:schemeClr val="bg1"/>
-                </a:solidFill>
                 <a:effectLst>
                   <a:outerShdw blurRad="38100" dist="22860" dir="5400000" algn="tl" rotWithShape="0">
                     <a:srgbClr val="000000">
@@ -5697,16 +5438,13 @@
                 <a:latin typeface="Times New Roman" panose="02020603050405020304" pitchFamily="18" charset="0"/>
                 <a:cs typeface="Times New Roman" panose="02020603050405020304" pitchFamily="18" charset="0"/>
               </a:rPr>
-              <a:t>Notice</a:t>
+              <a:t>Caution</a:t>
             </a:r>
             <a:endParaRPr lang="en-US" sz="11500" b="1" dirty="0">
               <a:ln w="10160">
                 <a:noFill/>
                 <a:prstDash val="solid"/>
               </a:ln>
-              <a:solidFill>
-                <a:schemeClr val="bg1"/>
-              </a:solidFill>
               <a:effectLst>
                 <a:outerShdw blurRad="38100" dist="22860" dir="5400000" algn="tl" rotWithShape="0">
                   <a:srgbClr val="000000">
@@ -5819,7 +5557,7 @@
         <p:spPr>
           <a:xfrm>
             <a:off x="2626469" y="1227340"/>
-            <a:ext cx="6517531" cy="2609176"/>
+            <a:ext cx="6517531" cy="2178289"/>
           </a:xfrm>
           <a:prstGeom prst="rect">
             <a:avLst/>
@@ -5857,19 +5595,12 @@
           </a:p>
           <a:p>
             <a:pPr algn="ctr"/>
-            <a:endParaRPr lang="en-US" sz="2800" b="1" dirty="0">
-              <a:latin typeface="Times New Roman" panose="02020603050405020304" pitchFamily="18" charset="0"/>
-              <a:cs typeface="Times New Roman" panose="02020603050405020304" pitchFamily="18" charset="0"/>
-            </a:endParaRPr>
-          </a:p>
-          <a:p>
-            <a:pPr algn="ctr"/>
             <a:r>
               <a:rPr lang="en-US" sz="2800" b="1" dirty="0">
                 <a:latin typeface="Times New Roman" panose="02020603050405020304" pitchFamily="18" charset="0"/>
                 <a:cs typeface="Times New Roman" panose="02020603050405020304" pitchFamily="18" charset="0"/>
               </a:rPr>
-              <a:t>Do not enter when sign is displayed.</a:t>
+              <a:t>Use caution if entering laser chamber.</a:t>
             </a:r>
           </a:p>
           <a:p>
@@ -6002,14 +5733,14 @@
         </p:nvSpPr>
         <p:spPr>
           <a:xfrm>
-            <a:off x="-9832" y="-6338"/>
-            <a:ext cx="9153832" cy="1233678"/>
+            <a:off x="-9833" y="-6338"/>
+            <a:ext cx="9226565" cy="1233678"/>
           </a:xfrm>
           <a:prstGeom prst="rect">
             <a:avLst/>
           </a:prstGeom>
           <a:solidFill>
-            <a:srgbClr val="002060"/>
+            <a:srgbClr val="FFFF00"/>
           </a:solidFill>
           <a:ln>
             <a:noFill/>
@@ -6083,9 +5814,6 @@
                   <a:noFill/>
                   <a:prstDash val="solid"/>
                 </a:ln>
-                <a:solidFill>
-                  <a:schemeClr val="bg1"/>
-                </a:solidFill>
                 <a:effectLst>
                   <a:outerShdw blurRad="38100" dist="22860" dir="5400000" algn="tl" rotWithShape="0">
                     <a:srgbClr val="000000">
@@ -6096,16 +5824,13 @@
                 <a:latin typeface="Times New Roman" panose="02020603050405020304" pitchFamily="18" charset="0"/>
                 <a:cs typeface="Times New Roman" panose="02020603050405020304" pitchFamily="18" charset="0"/>
               </a:rPr>
-              <a:t>Notice</a:t>
+              <a:t>Caution</a:t>
             </a:r>
             <a:endParaRPr lang="en-US" sz="11500" b="1" dirty="0">
               <a:ln w="10160">
                 <a:noFill/>
                 <a:prstDash val="solid"/>
               </a:ln>
-              <a:solidFill>
-                <a:schemeClr val="bg1"/>
-              </a:solidFill>
               <a:effectLst>
                 <a:outerShdw blurRad="38100" dist="22860" dir="5400000" algn="tl" rotWithShape="0">
                   <a:srgbClr val="000000">
@@ -6218,7 +5943,7 @@
         <p:spPr>
           <a:xfrm>
             <a:off x="2626471" y="1227340"/>
-            <a:ext cx="6517530" cy="2609176"/>
+            <a:ext cx="6517530" cy="2178289"/>
           </a:xfrm>
           <a:prstGeom prst="rect">
             <a:avLst/>
@@ -6256,19 +5981,12 @@
           </a:p>
           <a:p>
             <a:pPr algn="ctr"/>
-            <a:endParaRPr lang="en-US" sz="2800" b="1" dirty="0">
-              <a:latin typeface="Times New Roman" panose="02020603050405020304" pitchFamily="18" charset="0"/>
-              <a:cs typeface="Times New Roman" panose="02020603050405020304" pitchFamily="18" charset="0"/>
-            </a:endParaRPr>
-          </a:p>
-          <a:p>
-            <a:pPr algn="ctr"/>
             <a:r>
               <a:rPr lang="en-US" sz="2800" b="1" dirty="0">
                 <a:latin typeface="Times New Roman" panose="02020603050405020304" pitchFamily="18" charset="0"/>
                 <a:cs typeface="Times New Roman" panose="02020603050405020304" pitchFamily="18" charset="0"/>
               </a:rPr>
-              <a:t>Do not enter when sign is displayed.</a:t>
+              <a:t>Use caution if entering laser chamber.</a:t>
             </a:r>
           </a:p>
           <a:p>
@@ -6401,14 +6119,14 @@
         </p:nvSpPr>
         <p:spPr>
           <a:xfrm>
-            <a:off x="-9832" y="-6338"/>
-            <a:ext cx="9153832" cy="1233678"/>
+            <a:off x="-9833" y="-6338"/>
+            <a:ext cx="9226561" cy="1233678"/>
           </a:xfrm>
           <a:prstGeom prst="rect">
             <a:avLst/>
           </a:prstGeom>
           <a:solidFill>
-            <a:srgbClr val="002060"/>
+            <a:srgbClr val="FFFF00"/>
           </a:solidFill>
           <a:ln>
             <a:noFill/>
@@ -6482,9 +6200,6 @@
                   <a:noFill/>
                   <a:prstDash val="solid"/>
                 </a:ln>
-                <a:solidFill>
-                  <a:schemeClr val="bg1"/>
-                </a:solidFill>
                 <a:effectLst>
                   <a:outerShdw blurRad="38100" dist="22860" dir="5400000" algn="tl" rotWithShape="0">
                     <a:srgbClr val="000000">
@@ -6495,16 +6210,13 @@
                 <a:latin typeface="Times New Roman" panose="02020603050405020304" pitchFamily="18" charset="0"/>
                 <a:cs typeface="Times New Roman" panose="02020603050405020304" pitchFamily="18" charset="0"/>
               </a:rPr>
-              <a:t>Notice</a:t>
+              <a:t>Caution</a:t>
             </a:r>
             <a:endParaRPr lang="en-US" sz="11500" b="1" dirty="0">
               <a:ln w="10160">
                 <a:noFill/>
                 <a:prstDash val="solid"/>
               </a:ln>
-              <a:solidFill>
-                <a:schemeClr val="bg1"/>
-              </a:solidFill>
               <a:effectLst>
                 <a:outerShdw blurRad="38100" dist="22860" dir="5400000" algn="tl" rotWithShape="0">
                   <a:srgbClr val="000000">
@@ -6617,7 +6329,7 @@
         <p:spPr>
           <a:xfrm>
             <a:off x="2626469" y="1227340"/>
-            <a:ext cx="6517531" cy="2609176"/>
+            <a:ext cx="6517531" cy="2178289"/>
           </a:xfrm>
           <a:prstGeom prst="rect">
             <a:avLst/>
@@ -6655,19 +6367,12 @@
           </a:p>
           <a:p>
             <a:pPr algn="ctr"/>
-            <a:endParaRPr lang="en-US" sz="2800" b="1" dirty="0">
-              <a:latin typeface="Times New Roman" panose="02020603050405020304" pitchFamily="18" charset="0"/>
-              <a:cs typeface="Times New Roman" panose="02020603050405020304" pitchFamily="18" charset="0"/>
-            </a:endParaRPr>
-          </a:p>
-          <a:p>
-            <a:pPr algn="ctr"/>
             <a:r>
               <a:rPr lang="en-US" sz="2800" b="1" dirty="0">
                 <a:latin typeface="Times New Roman" panose="02020603050405020304" pitchFamily="18" charset="0"/>
                 <a:cs typeface="Times New Roman" panose="02020603050405020304" pitchFamily="18" charset="0"/>
               </a:rPr>
-              <a:t>Do not enter when sign is displayed.</a:t>
+              <a:t>Use caution if entering laser chamber.</a:t>
             </a:r>
           </a:p>
           <a:p>
@@ -6800,8 +6505,8 @@
         </p:nvSpPr>
         <p:spPr>
           <a:xfrm>
-            <a:off x="-9832" y="-6338"/>
-            <a:ext cx="9153832" cy="1233678"/>
+            <a:off x="-9833" y="-6338"/>
+            <a:ext cx="9236955" cy="1233678"/>
           </a:xfrm>
           <a:prstGeom prst="rect">
             <a:avLst/>

</xml_diff>